<commit_message>
Modified template (minor change): switch "Overview" title to "Table of Contents" and added "Example Implementation" slide to remind us to end each lecture with an algorithm demonstrating the pattern.
</commit_message>
<xml_diff>
--- a/lecture_content/classSlides/1_mapPattern/mapPattern.pptx
+++ b/lecture_content/classSlides/1_mapPattern/mapPattern.pptx
@@ -5,15 +5,16 @@
     <p:sldMasterId id="2147483648" r:id="rId1"/>
   </p:sldMasterIdLst>
   <p:notesMasterIdLst>
-    <p:notesMasterId r:id="rId5"/>
+    <p:notesMasterId r:id="rId6"/>
   </p:notesMasterIdLst>
   <p:handoutMasterIdLst>
-    <p:handoutMasterId r:id="rId6"/>
+    <p:handoutMasterId r:id="rId7"/>
   </p:handoutMasterIdLst>
   <p:sldIdLst>
     <p:sldId id="256" r:id="rId2"/>
     <p:sldId id="257" r:id="rId3"/>
     <p:sldId id="258" r:id="rId4"/>
+    <p:sldId id="259" r:id="rId5"/>
   </p:sldIdLst>
   <p:sldSz cx="9144000" cy="6858000" type="screen4x3"/>
   <p:notesSz cx="6858000" cy="9144000"/>
@@ -256,7 +257,7 @@
               <a:pPr>
                 <a:defRPr/>
               </a:pPr>
-              <a:t>3/5/14</a:t>
+              <a:t>3/6/14</a:t>
             </a:fld>
             <a:endParaRPr lang="en-US"/>
           </a:p>
@@ -480,7 +481,7 @@
               <a:pPr>
                 <a:defRPr/>
               </a:pPr>
-              <a:t>3/5/14</a:t>
+              <a:t>3/6/14</a:t>
             </a:fld>
             <a:endParaRPr lang="en-US"/>
           </a:p>
@@ -4216,7 +4217,7 @@
           <a:p>
             <a:r>
               <a:rPr lang="en-US" dirty="0" smtClean="0"/>
-              <a:t>TITLE</a:t>
+              <a:t>Map Pattern</a:t>
             </a:r>
             <a:endParaRPr lang="en-US" dirty="0"/>
           </a:p>
@@ -4260,20 +4261,11 @@
               <a:rPr lang="en-US" dirty="0" smtClean="0"/>
               <a:t>510</a:t>
             </a:r>
-            <a:endParaRPr lang="en-US" dirty="0" smtClean="0"/>
           </a:p>
           <a:p>
             <a:r>
               <a:rPr lang="en-US" dirty="0" smtClean="0"/>
-              <a:t>Department </a:t>
-            </a:r>
-            <a:r>
-              <a:rPr lang="en-US" dirty="0" smtClean="0"/>
-              <a:t>of Computer and Information </a:t>
-            </a:r>
-            <a:r>
-              <a:rPr lang="en-US" dirty="0" smtClean="0"/>
-              <a:t>Science</a:t>
+              <a:t>Department of Computer and Information Science</a:t>
             </a:r>
           </a:p>
         </p:txBody>
@@ -4381,7 +4373,7 @@
           <a:p>
             <a:r>
               <a:rPr lang="en-US" dirty="0" smtClean="0"/>
-              <a:t>Overview</a:t>
+              <a:t>Table of Contents</a:t>
             </a:r>
             <a:endParaRPr lang="en-US" dirty="0"/>
           </a:p>
@@ -4617,6 +4609,133 @@
     <p:extLst>
       <p:ext uri="{BB962C8B-B14F-4D97-AF65-F5344CB8AC3E}">
         <p14:creationId xmlns:p14="http://schemas.microsoft.com/office/powerpoint/2010/main" val="2323269314"/>
+      </p:ext>
+    </p:extLst>
+  </p:cSld>
+  <p:clrMapOvr>
+    <a:masterClrMapping/>
+  </p:clrMapOvr>
+</p:sld>
+</file>
+
+<file path=ppt/slides/slide4.xml><?xml version="1.0" encoding="utf-8"?>
+<p:sld xmlns:a="http://schemas.openxmlformats.org/drawingml/2006/main" xmlns:r="http://schemas.openxmlformats.org/officeDocument/2006/relationships" xmlns:p="http://schemas.openxmlformats.org/presentationml/2006/main">
+  <p:cSld>
+    <p:spTree>
+      <p:nvGrpSpPr>
+        <p:cNvPr id="1" name=""/>
+        <p:cNvGrpSpPr/>
+        <p:nvPr/>
+      </p:nvGrpSpPr>
+      <p:grpSpPr>
+        <a:xfrm>
+          <a:off x="0" y="0"/>
+          <a:ext cx="0" cy="0"/>
+          <a:chOff x="0" y="0"/>
+          <a:chExt cx="0" cy="0"/>
+        </a:xfrm>
+      </p:grpSpPr>
+      <p:sp>
+        <p:nvSpPr>
+          <p:cNvPr id="2" name="Title 1"/>
+          <p:cNvSpPr>
+            <a:spLocks noGrp="1"/>
+          </p:cNvSpPr>
+          <p:nvPr>
+            <p:ph type="title"/>
+          </p:nvPr>
+        </p:nvSpPr>
+        <p:spPr/>
+        <p:txBody>
+          <a:bodyPr/>
+          <a:lstStyle/>
+          <a:p>
+            <a:r>
+              <a:rPr lang="en-US" dirty="0" smtClean="0"/>
+              <a:t>Example Implementation</a:t>
+            </a:r>
+            <a:endParaRPr lang="en-US" dirty="0"/>
+          </a:p>
+        </p:txBody>
+      </p:sp>
+      <p:sp>
+        <p:nvSpPr>
+          <p:cNvPr id="3" name="Content Placeholder 2"/>
+          <p:cNvSpPr>
+            <a:spLocks noGrp="1"/>
+          </p:cNvSpPr>
+          <p:nvPr>
+            <p:ph idx="1"/>
+          </p:nvPr>
+        </p:nvSpPr>
+        <p:spPr/>
+        <p:txBody>
+          <a:bodyPr/>
+          <a:lstStyle/>
+          <a:p>
+            <a:endParaRPr lang="en-US"/>
+          </a:p>
+        </p:txBody>
+      </p:sp>
+      <p:sp>
+        <p:nvSpPr>
+          <p:cNvPr id="4" name="Footer Placeholder 3"/>
+          <p:cNvSpPr>
+            <a:spLocks noGrp="1"/>
+          </p:cNvSpPr>
+          <p:nvPr>
+            <p:ph type="ftr" sz="quarter" idx="11"/>
+          </p:nvPr>
+        </p:nvSpPr>
+        <p:spPr/>
+        <p:txBody>
+          <a:bodyPr/>
+          <a:lstStyle/>
+          <a:p>
+            <a:pPr>
+              <a:defRPr/>
+            </a:pPr>
+            <a:r>
+              <a:rPr lang="en-US" smtClean="0"/>
+              <a:t>CIS 410/510: Parallel Computing, University of Oregon, Spring 2014</a:t>
+            </a:r>
+            <a:endParaRPr lang="en-US" dirty="0"/>
+          </a:p>
+        </p:txBody>
+      </p:sp>
+      <p:sp>
+        <p:nvSpPr>
+          <p:cNvPr id="5" name="Slide Number Placeholder 4"/>
+          <p:cNvSpPr>
+            <a:spLocks noGrp="1"/>
+          </p:cNvSpPr>
+          <p:nvPr>
+            <p:ph type="sldNum" sz="quarter" idx="12"/>
+          </p:nvPr>
+        </p:nvSpPr>
+        <p:spPr/>
+        <p:txBody>
+          <a:bodyPr/>
+          <a:lstStyle/>
+          <a:p>
+            <a:pPr>
+              <a:defRPr/>
+            </a:pPr>
+            <a:fld id="{F2F21A90-E327-C84D-81B5-071D4C5C9FC6}" type="slidenum">
+              <a:rPr lang="en-US" smtClean="0"/>
+              <a:pPr>
+                <a:defRPr/>
+              </a:pPr>
+              <a:t>4</a:t>
+            </a:fld>
+            <a:endParaRPr lang="en-US"/>
+          </a:p>
+        </p:txBody>
+      </p:sp>
+    </p:spTree>
+    <p:extLst>
+      <p:ext uri="{BB962C8B-B14F-4D97-AF65-F5344CB8AC3E}">
+        <p14:creationId xmlns:p14="http://schemas.microsoft.com/office/powerpoint/2010/main" val="3264597891"/>
       </p:ext>
     </p:extLst>
   </p:cSld>

</xml_diff>